<commit_message>
Fix bugs in the SRS document
</commit_message>
<xml_diff>
--- a/IDEAS/Final Ideas Submitted/Approved Idea/NTU Real-Time Bus ID Verification and Tracking.pptx
+++ b/IDEAS/Final Ideas Submitted/Approved Idea/NTU Real-Time Bus ID Verification and Tracking.pptx
@@ -170,10 +170,9 @@
           <a:lstStyle/>
           <a:p>
             <a:r>
-              <a:rPr lang="en-US" smtClean="0"/>
+              <a:rPr lang="en-US"/>
               <a:t>Click to edit Master title style</a:t>
             </a:r>
-            <a:endParaRPr lang="en-US"/>
           </a:p>
         </p:txBody>
       </p:sp>
@@ -289,10 +288,9 @@
           </a:lstStyle>
           <a:p>
             <a:r>
-              <a:rPr lang="en-US" smtClean="0"/>
+              <a:rPr lang="en-US"/>
               <a:t>Click to edit Master subtitle style</a:t>
             </a:r>
-            <a:endParaRPr lang="en-US"/>
           </a:p>
         </p:txBody>
       </p:sp>
@@ -313,7 +311,7 @@
           <a:p>
             <a:fld id="{5BCAD085-E8A6-8845-BD4E-CB4CCA059FC4}" type="datetimeFigureOut">
               <a:rPr lang="en-US" smtClean="0"/>
-              <a:t>23/10/2024</a:t>
+              <a:t>7/3/2025</a:t>
             </a:fld>
             <a:endParaRPr lang="en-US"/>
           </a:p>
@@ -407,10 +405,9 @@
           <a:lstStyle/>
           <a:p>
             <a:r>
-              <a:rPr lang="en-US" smtClean="0"/>
+              <a:rPr lang="en-US"/>
               <a:t>Click to edit Master title style</a:t>
             </a:r>
-            <a:endParaRPr lang="en-US"/>
           </a:p>
         </p:txBody>
       </p:sp>
@@ -431,38 +428,37 @@
           <a:p>
             <a:pPr lvl="0"/>
             <a:r>
-              <a:rPr lang="en-US" smtClean="0"/>
+              <a:rPr lang="en-US"/>
               <a:t>Click to edit Master text styles</a:t>
             </a:r>
           </a:p>
           <a:p>
             <a:pPr lvl="1"/>
             <a:r>
-              <a:rPr lang="en-US" smtClean="0"/>
+              <a:rPr lang="en-US"/>
               <a:t>Second level</a:t>
             </a:r>
           </a:p>
           <a:p>
             <a:pPr lvl="2"/>
             <a:r>
-              <a:rPr lang="en-US" smtClean="0"/>
+              <a:rPr lang="en-US"/>
               <a:t>Third level</a:t>
             </a:r>
           </a:p>
           <a:p>
             <a:pPr lvl="3"/>
             <a:r>
-              <a:rPr lang="en-US" smtClean="0"/>
+              <a:rPr lang="en-US"/>
               <a:t>Fourth level</a:t>
             </a:r>
           </a:p>
           <a:p>
             <a:pPr lvl="4"/>
             <a:r>
-              <a:rPr lang="en-US" smtClean="0"/>
+              <a:rPr lang="en-US"/>
               <a:t>Fifth level</a:t>
             </a:r>
-            <a:endParaRPr lang="en-US"/>
           </a:p>
         </p:txBody>
       </p:sp>
@@ -483,7 +479,7 @@
           <a:p>
             <a:fld id="{5BCAD085-E8A6-8845-BD4E-CB4CCA059FC4}" type="datetimeFigureOut">
               <a:rPr lang="en-US" smtClean="0"/>
-              <a:t>23/10/2024</a:t>
+              <a:t>7/3/2025</a:t>
             </a:fld>
             <a:endParaRPr lang="en-US"/>
           </a:p>
@@ -582,10 +578,9 @@
           <a:lstStyle/>
           <a:p>
             <a:r>
-              <a:rPr lang="en-US" smtClean="0"/>
+              <a:rPr lang="en-US"/>
               <a:t>Click to edit Master title style</a:t>
             </a:r>
-            <a:endParaRPr lang="en-US"/>
           </a:p>
         </p:txBody>
       </p:sp>
@@ -611,38 +606,37 @@
           <a:p>
             <a:pPr lvl="0"/>
             <a:r>
-              <a:rPr lang="en-US" smtClean="0"/>
+              <a:rPr lang="en-US"/>
               <a:t>Click to edit Master text styles</a:t>
             </a:r>
           </a:p>
           <a:p>
             <a:pPr lvl="1"/>
             <a:r>
-              <a:rPr lang="en-US" smtClean="0"/>
+              <a:rPr lang="en-US"/>
               <a:t>Second level</a:t>
             </a:r>
           </a:p>
           <a:p>
             <a:pPr lvl="2"/>
             <a:r>
-              <a:rPr lang="en-US" smtClean="0"/>
+              <a:rPr lang="en-US"/>
               <a:t>Third level</a:t>
             </a:r>
           </a:p>
           <a:p>
             <a:pPr lvl="3"/>
             <a:r>
-              <a:rPr lang="en-US" smtClean="0"/>
+              <a:rPr lang="en-US"/>
               <a:t>Fourth level</a:t>
             </a:r>
           </a:p>
           <a:p>
             <a:pPr lvl="4"/>
             <a:r>
-              <a:rPr lang="en-US" smtClean="0"/>
+              <a:rPr lang="en-US"/>
               <a:t>Fifth level</a:t>
             </a:r>
-            <a:endParaRPr lang="en-US"/>
           </a:p>
         </p:txBody>
       </p:sp>
@@ -663,7 +657,7 @@
           <a:p>
             <a:fld id="{5BCAD085-E8A6-8845-BD4E-CB4CCA059FC4}" type="datetimeFigureOut">
               <a:rPr lang="en-US" smtClean="0"/>
-              <a:t>23/10/2024</a:t>
+              <a:t>7/3/2025</a:t>
             </a:fld>
             <a:endParaRPr lang="en-US"/>
           </a:p>
@@ -757,10 +751,9 @@
           <a:lstStyle/>
           <a:p>
             <a:r>
-              <a:rPr lang="en-US" smtClean="0"/>
+              <a:rPr lang="en-US"/>
               <a:t>Click to edit Master title style</a:t>
             </a:r>
-            <a:endParaRPr lang="en-US"/>
           </a:p>
         </p:txBody>
       </p:sp>
@@ -781,38 +774,37 @@
           <a:p>
             <a:pPr lvl="0"/>
             <a:r>
-              <a:rPr lang="en-US" smtClean="0"/>
+              <a:rPr lang="en-US"/>
               <a:t>Click to edit Master text styles</a:t>
             </a:r>
           </a:p>
           <a:p>
             <a:pPr lvl="1"/>
             <a:r>
-              <a:rPr lang="en-US" smtClean="0"/>
+              <a:rPr lang="en-US"/>
               <a:t>Second level</a:t>
             </a:r>
           </a:p>
           <a:p>
             <a:pPr lvl="2"/>
             <a:r>
-              <a:rPr lang="en-US" smtClean="0"/>
+              <a:rPr lang="en-US"/>
               <a:t>Third level</a:t>
             </a:r>
           </a:p>
           <a:p>
             <a:pPr lvl="3"/>
             <a:r>
-              <a:rPr lang="en-US" smtClean="0"/>
+              <a:rPr lang="en-US"/>
               <a:t>Fourth level</a:t>
             </a:r>
           </a:p>
           <a:p>
             <a:pPr lvl="4"/>
             <a:r>
-              <a:rPr lang="en-US" smtClean="0"/>
+              <a:rPr lang="en-US"/>
               <a:t>Fifth level</a:t>
             </a:r>
-            <a:endParaRPr lang="en-US"/>
           </a:p>
         </p:txBody>
       </p:sp>
@@ -833,7 +825,7 @@
           <a:p>
             <a:fld id="{5BCAD085-E8A6-8845-BD4E-CB4CCA059FC4}" type="datetimeFigureOut">
               <a:rPr lang="en-US" smtClean="0"/>
-              <a:t>23/10/2024</a:t>
+              <a:t>7/3/2025</a:t>
             </a:fld>
             <a:endParaRPr lang="en-US"/>
           </a:p>
@@ -936,10 +928,9 @@
           </a:lstStyle>
           <a:p>
             <a:r>
-              <a:rPr lang="en-US" smtClean="0"/>
+              <a:rPr lang="en-US"/>
               <a:t>Click to edit Master title style</a:t>
             </a:r>
-            <a:endParaRPr lang="en-US"/>
           </a:p>
         </p:txBody>
       </p:sp>
@@ -1056,7 +1047,7 @@
           <a:p>
             <a:pPr lvl="0"/>
             <a:r>
-              <a:rPr lang="en-US" smtClean="0"/>
+              <a:rPr lang="en-US"/>
               <a:t>Click to edit Master text styles</a:t>
             </a:r>
           </a:p>
@@ -1079,7 +1070,7 @@
           <a:p>
             <a:fld id="{5BCAD085-E8A6-8845-BD4E-CB4CCA059FC4}" type="datetimeFigureOut">
               <a:rPr lang="en-US" smtClean="0"/>
-              <a:t>23/10/2024</a:t>
+              <a:t>7/3/2025</a:t>
             </a:fld>
             <a:endParaRPr lang="en-US"/>
           </a:p>
@@ -1173,10 +1164,9 @@
           <a:lstStyle/>
           <a:p>
             <a:r>
-              <a:rPr lang="en-US" smtClean="0"/>
+              <a:rPr lang="en-US"/>
               <a:t>Click to edit Master title style</a:t>
             </a:r>
-            <a:endParaRPr lang="en-US"/>
           </a:p>
         </p:txBody>
       </p:sp>
@@ -1230,38 +1220,37 @@
           <a:p>
             <a:pPr lvl="0"/>
             <a:r>
-              <a:rPr lang="en-US" smtClean="0"/>
+              <a:rPr lang="en-US"/>
               <a:t>Click to edit Master text styles</a:t>
             </a:r>
           </a:p>
           <a:p>
             <a:pPr lvl="1"/>
             <a:r>
-              <a:rPr lang="en-US" smtClean="0"/>
+              <a:rPr lang="en-US"/>
               <a:t>Second level</a:t>
             </a:r>
           </a:p>
           <a:p>
             <a:pPr lvl="2"/>
             <a:r>
-              <a:rPr lang="en-US" smtClean="0"/>
+              <a:rPr lang="en-US"/>
               <a:t>Third level</a:t>
             </a:r>
           </a:p>
           <a:p>
             <a:pPr lvl="3"/>
             <a:r>
-              <a:rPr lang="en-US" smtClean="0"/>
+              <a:rPr lang="en-US"/>
               <a:t>Fourth level</a:t>
             </a:r>
           </a:p>
           <a:p>
             <a:pPr lvl="4"/>
             <a:r>
-              <a:rPr lang="en-US" smtClean="0"/>
+              <a:rPr lang="en-US"/>
               <a:t>Fifth level</a:t>
             </a:r>
-            <a:endParaRPr lang="en-US"/>
           </a:p>
         </p:txBody>
       </p:sp>
@@ -1315,38 +1304,37 @@
           <a:p>
             <a:pPr lvl="0"/>
             <a:r>
-              <a:rPr lang="en-US" smtClean="0"/>
+              <a:rPr lang="en-US"/>
               <a:t>Click to edit Master text styles</a:t>
             </a:r>
           </a:p>
           <a:p>
             <a:pPr lvl="1"/>
             <a:r>
-              <a:rPr lang="en-US" smtClean="0"/>
+              <a:rPr lang="en-US"/>
               <a:t>Second level</a:t>
             </a:r>
           </a:p>
           <a:p>
             <a:pPr lvl="2"/>
             <a:r>
-              <a:rPr lang="en-US" smtClean="0"/>
+              <a:rPr lang="en-US"/>
               <a:t>Third level</a:t>
             </a:r>
           </a:p>
           <a:p>
             <a:pPr lvl="3"/>
             <a:r>
-              <a:rPr lang="en-US" smtClean="0"/>
+              <a:rPr lang="en-US"/>
               <a:t>Fourth level</a:t>
             </a:r>
           </a:p>
           <a:p>
             <a:pPr lvl="4"/>
             <a:r>
-              <a:rPr lang="en-US" smtClean="0"/>
+              <a:rPr lang="en-US"/>
               <a:t>Fifth level</a:t>
             </a:r>
-            <a:endParaRPr lang="en-US"/>
           </a:p>
         </p:txBody>
       </p:sp>
@@ -1367,7 +1355,7 @@
           <a:p>
             <a:fld id="{5BCAD085-E8A6-8845-BD4E-CB4CCA059FC4}" type="datetimeFigureOut">
               <a:rPr lang="en-US" smtClean="0"/>
-              <a:t>23/10/2024</a:t>
+              <a:t>7/3/2025</a:t>
             </a:fld>
             <a:endParaRPr lang="en-US"/>
           </a:p>
@@ -1465,10 +1453,9 @@
           </a:lstStyle>
           <a:p>
             <a:r>
-              <a:rPr lang="en-US" smtClean="0"/>
+              <a:rPr lang="en-US"/>
               <a:t>Click to edit Master title style</a:t>
             </a:r>
-            <a:endParaRPr lang="en-US"/>
           </a:p>
         </p:txBody>
       </p:sp>
@@ -1531,7 +1518,7 @@
           <a:p>
             <a:pPr lvl="0"/>
             <a:r>
-              <a:rPr lang="en-US" smtClean="0"/>
+              <a:rPr lang="en-US"/>
               <a:t>Click to edit Master text styles</a:t>
             </a:r>
           </a:p>
@@ -1587,38 +1574,37 @@
           <a:p>
             <a:pPr lvl="0"/>
             <a:r>
-              <a:rPr lang="en-US" smtClean="0"/>
+              <a:rPr lang="en-US"/>
               <a:t>Click to edit Master text styles</a:t>
             </a:r>
           </a:p>
           <a:p>
             <a:pPr lvl="1"/>
             <a:r>
-              <a:rPr lang="en-US" smtClean="0"/>
+              <a:rPr lang="en-US"/>
               <a:t>Second level</a:t>
             </a:r>
           </a:p>
           <a:p>
             <a:pPr lvl="2"/>
             <a:r>
-              <a:rPr lang="en-US" smtClean="0"/>
+              <a:rPr lang="en-US"/>
               <a:t>Third level</a:t>
             </a:r>
           </a:p>
           <a:p>
             <a:pPr lvl="3"/>
             <a:r>
-              <a:rPr lang="en-US" smtClean="0"/>
+              <a:rPr lang="en-US"/>
               <a:t>Fourth level</a:t>
             </a:r>
           </a:p>
           <a:p>
             <a:pPr lvl="4"/>
             <a:r>
-              <a:rPr lang="en-US" smtClean="0"/>
+              <a:rPr lang="en-US"/>
               <a:t>Fifth level</a:t>
             </a:r>
-            <a:endParaRPr lang="en-US"/>
           </a:p>
         </p:txBody>
       </p:sp>
@@ -1681,7 +1667,7 @@
           <a:p>
             <a:pPr lvl="0"/>
             <a:r>
-              <a:rPr lang="en-US" smtClean="0"/>
+              <a:rPr lang="en-US"/>
               <a:t>Click to edit Master text styles</a:t>
             </a:r>
           </a:p>
@@ -1737,38 +1723,37 @@
           <a:p>
             <a:pPr lvl="0"/>
             <a:r>
-              <a:rPr lang="en-US" smtClean="0"/>
+              <a:rPr lang="en-US"/>
               <a:t>Click to edit Master text styles</a:t>
             </a:r>
           </a:p>
           <a:p>
             <a:pPr lvl="1"/>
             <a:r>
-              <a:rPr lang="en-US" smtClean="0"/>
+              <a:rPr lang="en-US"/>
               <a:t>Second level</a:t>
             </a:r>
           </a:p>
           <a:p>
             <a:pPr lvl="2"/>
             <a:r>
-              <a:rPr lang="en-US" smtClean="0"/>
+              <a:rPr lang="en-US"/>
               <a:t>Third level</a:t>
             </a:r>
           </a:p>
           <a:p>
             <a:pPr lvl="3"/>
             <a:r>
-              <a:rPr lang="en-US" smtClean="0"/>
+              <a:rPr lang="en-US"/>
               <a:t>Fourth level</a:t>
             </a:r>
           </a:p>
           <a:p>
             <a:pPr lvl="4"/>
             <a:r>
-              <a:rPr lang="en-US" smtClean="0"/>
+              <a:rPr lang="en-US"/>
               <a:t>Fifth level</a:t>
             </a:r>
-            <a:endParaRPr lang="en-US"/>
           </a:p>
         </p:txBody>
       </p:sp>
@@ -1789,7 +1774,7 @@
           <a:p>
             <a:fld id="{5BCAD085-E8A6-8845-BD4E-CB4CCA059FC4}" type="datetimeFigureOut">
               <a:rPr lang="en-US" smtClean="0"/>
-              <a:t>23/10/2024</a:t>
+              <a:t>7/3/2025</a:t>
             </a:fld>
             <a:endParaRPr lang="en-US"/>
           </a:p>
@@ -1883,10 +1868,9 @@
           <a:lstStyle/>
           <a:p>
             <a:r>
-              <a:rPr lang="en-US" smtClean="0"/>
+              <a:rPr lang="en-US"/>
               <a:t>Click to edit Master title style</a:t>
             </a:r>
-            <a:endParaRPr lang="en-US"/>
           </a:p>
         </p:txBody>
       </p:sp>
@@ -1907,7 +1891,7 @@
           <a:p>
             <a:fld id="{5BCAD085-E8A6-8845-BD4E-CB4CCA059FC4}" type="datetimeFigureOut">
               <a:rPr lang="en-US" smtClean="0"/>
-              <a:t>23/10/2024</a:t>
+              <a:t>7/3/2025</a:t>
             </a:fld>
             <a:endParaRPr lang="en-US"/>
           </a:p>
@@ -2002,7 +1986,7 @@
           <a:p>
             <a:fld id="{5BCAD085-E8A6-8845-BD4E-CB4CCA059FC4}" type="datetimeFigureOut">
               <a:rPr lang="en-US" smtClean="0"/>
-              <a:t>23/10/2024</a:t>
+              <a:t>7/3/2025</a:t>
             </a:fld>
             <a:endParaRPr lang="en-US"/>
           </a:p>
@@ -2105,10 +2089,9 @@
           </a:lstStyle>
           <a:p>
             <a:r>
-              <a:rPr lang="en-US" smtClean="0"/>
+              <a:rPr lang="en-US"/>
               <a:t>Click to edit Master title style</a:t>
             </a:r>
-            <a:endParaRPr lang="en-US"/>
           </a:p>
         </p:txBody>
       </p:sp>
@@ -2162,38 +2145,37 @@
           <a:p>
             <a:pPr lvl="0"/>
             <a:r>
-              <a:rPr lang="en-US" smtClean="0"/>
+              <a:rPr lang="en-US"/>
               <a:t>Click to edit Master text styles</a:t>
             </a:r>
           </a:p>
           <a:p>
             <a:pPr lvl="1"/>
             <a:r>
-              <a:rPr lang="en-US" smtClean="0"/>
+              <a:rPr lang="en-US"/>
               <a:t>Second level</a:t>
             </a:r>
           </a:p>
           <a:p>
             <a:pPr lvl="2"/>
             <a:r>
-              <a:rPr lang="en-US" smtClean="0"/>
+              <a:rPr lang="en-US"/>
               <a:t>Third level</a:t>
             </a:r>
           </a:p>
           <a:p>
             <a:pPr lvl="3"/>
             <a:r>
-              <a:rPr lang="en-US" smtClean="0"/>
+              <a:rPr lang="en-US"/>
               <a:t>Fourth level</a:t>
             </a:r>
           </a:p>
           <a:p>
             <a:pPr lvl="4"/>
             <a:r>
-              <a:rPr lang="en-US" smtClean="0"/>
+              <a:rPr lang="en-US"/>
               <a:t>Fifth level</a:t>
             </a:r>
-            <a:endParaRPr lang="en-US"/>
           </a:p>
         </p:txBody>
       </p:sp>
@@ -2256,7 +2238,7 @@
           <a:p>
             <a:pPr lvl="0"/>
             <a:r>
-              <a:rPr lang="en-US" smtClean="0"/>
+              <a:rPr lang="en-US"/>
               <a:t>Click to edit Master text styles</a:t>
             </a:r>
           </a:p>
@@ -2279,7 +2261,7 @@
           <a:p>
             <a:fld id="{5BCAD085-E8A6-8845-BD4E-CB4CCA059FC4}" type="datetimeFigureOut">
               <a:rPr lang="en-US" smtClean="0"/>
-              <a:t>23/10/2024</a:t>
+              <a:t>7/3/2025</a:t>
             </a:fld>
             <a:endParaRPr lang="en-US"/>
           </a:p>
@@ -2382,10 +2364,9 @@
           </a:lstStyle>
           <a:p>
             <a:r>
-              <a:rPr lang="en-US" smtClean="0"/>
+              <a:rPr lang="en-US"/>
               <a:t>Click to edit Master title style</a:t>
             </a:r>
-            <a:endParaRPr lang="en-US"/>
           </a:p>
         </p:txBody>
       </p:sp>
@@ -2509,7 +2490,7 @@
           <a:p>
             <a:pPr lvl="0"/>
             <a:r>
-              <a:rPr lang="en-US" smtClean="0"/>
+              <a:rPr lang="en-US"/>
               <a:t>Click to edit Master text styles</a:t>
             </a:r>
           </a:p>
@@ -2532,7 +2513,7 @@
           <a:p>
             <a:fld id="{5BCAD085-E8A6-8845-BD4E-CB4CCA059FC4}" type="datetimeFigureOut">
               <a:rPr lang="en-US" smtClean="0"/>
-              <a:t>23/10/2024</a:t>
+              <a:t>7/3/2025</a:t>
             </a:fld>
             <a:endParaRPr lang="en-US"/>
           </a:p>
@@ -2641,10 +2622,9 @@
           <a:lstStyle/>
           <a:p>
             <a:r>
-              <a:rPr lang="en-US" smtClean="0"/>
+              <a:rPr lang="en-US"/>
               <a:t>Click to edit Master title style</a:t>
             </a:r>
-            <a:endParaRPr lang="en-US"/>
           </a:p>
         </p:txBody>
       </p:sp>
@@ -2675,38 +2655,37 @@
           <a:p>
             <a:pPr lvl="0"/>
             <a:r>
-              <a:rPr lang="en-US" smtClean="0"/>
+              <a:rPr lang="en-US"/>
               <a:t>Click to edit Master text styles</a:t>
             </a:r>
           </a:p>
           <a:p>
             <a:pPr lvl="1"/>
             <a:r>
-              <a:rPr lang="en-US" smtClean="0"/>
+              <a:rPr lang="en-US"/>
               <a:t>Second level</a:t>
             </a:r>
           </a:p>
           <a:p>
             <a:pPr lvl="2"/>
             <a:r>
-              <a:rPr lang="en-US" smtClean="0"/>
+              <a:rPr lang="en-US"/>
               <a:t>Third level</a:t>
             </a:r>
           </a:p>
           <a:p>
             <a:pPr lvl="3"/>
             <a:r>
-              <a:rPr lang="en-US" smtClean="0"/>
+              <a:rPr lang="en-US"/>
               <a:t>Fourth level</a:t>
             </a:r>
           </a:p>
           <a:p>
             <a:pPr lvl="4"/>
             <a:r>
-              <a:rPr lang="en-US" smtClean="0"/>
+              <a:rPr lang="en-US"/>
               <a:t>Fifth level</a:t>
             </a:r>
-            <a:endParaRPr lang="en-US"/>
           </a:p>
         </p:txBody>
       </p:sp>
@@ -2745,7 +2724,7 @@
           <a:p>
             <a:fld id="{5BCAD085-E8A6-8845-BD4E-CB4CCA059FC4}" type="datetimeFigureOut">
               <a:rPr lang="en-US" smtClean="0"/>
-              <a:t>23/10/2024</a:t>
+              <a:t>7/3/2025</a:t>
             </a:fld>
             <a:endParaRPr lang="en-US"/>
           </a:p>
@@ -3184,7 +3163,7 @@
               <a:t>Presented by: </a:t>
             </a:r>
             <a:r>
-              <a:rPr lang="en-GB" dirty="0" smtClean="0"/>
+              <a:rPr lang="en-GB" dirty="0"/>
               <a:t>FYP-24-SE-A-04</a:t>
             </a:r>
           </a:p>
@@ -3201,15 +3180,15 @@
               <a:t>Supervisor: Sir </a:t>
             </a:r>
             <a:r>
-              <a:rPr lang="en-GB" dirty="0" err="1" smtClean="0"/>
+              <a:rPr lang="en-GB" dirty="0" err="1"/>
               <a:t>Zahid</a:t>
             </a:r>
             <a:r>
-              <a:rPr lang="en-GB" dirty="0" smtClean="0"/>
+              <a:rPr lang="en-GB" dirty="0"/>
               <a:t> </a:t>
             </a:r>
             <a:r>
-              <a:rPr lang="en-GB" dirty="0" err="1" smtClean="0"/>
+              <a:rPr lang="en-GB" dirty="0" err="1"/>
               <a:t>Javed</a:t>
             </a:r>
             <a:endParaRPr dirty="0"/>
@@ -3272,16 +3251,12 @@
               </a:defRPr>
             </a:pPr>
             <a:r>
-              <a:rPr lang="en-GB" dirty="0" smtClean="0"/>
+              <a:rPr lang="en-GB" dirty="0"/>
               <a:t>6</a:t>
             </a:r>
             <a:r>
-              <a:rPr dirty="0" smtClean="0"/>
-              <a:t>. </a:t>
-            </a:r>
-            <a:r>
               <a:rPr dirty="0"/>
-              <a:t>Conclusion</a:t>
+              <a:t>. Conclusion</a:t>
             </a:r>
           </a:p>
         </p:txBody>
@@ -3400,12 +3375,8 @@
               </a:defRPr>
             </a:pPr>
             <a:r>
-              <a:rPr dirty="0" smtClean="0"/>
-              <a:t>Problem </a:t>
-            </a:r>
-            <a:r>
               <a:rPr dirty="0"/>
-              <a:t>Statement</a:t>
+              <a:t>Problem Statement</a:t>
             </a:r>
           </a:p>
           <a:p>
@@ -3419,12 +3390,8 @@
               </a:defRPr>
             </a:pPr>
             <a:r>
-              <a:rPr dirty="0" smtClean="0"/>
-              <a:t>Proposed </a:t>
-            </a:r>
-            <a:r>
               <a:rPr dirty="0"/>
-              <a:t>Solution</a:t>
+              <a:t>Proposed Solution</a:t>
             </a:r>
           </a:p>
           <a:p>
@@ -3438,7 +3405,7 @@
               </a:defRPr>
             </a:pPr>
             <a:r>
-              <a:rPr dirty="0" smtClean="0"/>
+              <a:rPr dirty="0"/>
               <a:t>Key Features</a:t>
             </a:r>
             <a:endParaRPr lang="en-GB" dirty="0"/>
@@ -3492,11 +3459,7 @@
             </a:pPr>
             <a:r>
               <a:rPr lang="en-GB" dirty="0"/>
-              <a:t>Driver Efficiency </a:t>
-            </a:r>
-            <a:r>
-              <a:rPr lang="en-GB" dirty="0" smtClean="0"/>
-              <a:t>Monitoring</a:t>
+              <a:t>Driver Efficiency Monitoring</a:t>
             </a:r>
             <a:endParaRPr dirty="0"/>
           </a:p>
@@ -3511,12 +3474,8 @@
               </a:defRPr>
             </a:pPr>
             <a:r>
-              <a:rPr dirty="0" smtClean="0"/>
-              <a:t>Technology </a:t>
-            </a:r>
-            <a:r>
               <a:rPr dirty="0"/>
-              <a:t>Stack</a:t>
+              <a:t>Technology Stack</a:t>
             </a:r>
           </a:p>
           <a:p>
@@ -3530,12 +3489,8 @@
               </a:defRPr>
             </a:pPr>
             <a:r>
-              <a:rPr dirty="0" smtClean="0"/>
-              <a:t>Expected </a:t>
-            </a:r>
-            <a:r>
               <a:rPr dirty="0"/>
-              <a:t>Outcomes</a:t>
+              <a:t>Expected Outcomes</a:t>
             </a:r>
           </a:p>
           <a:p>
@@ -3549,10 +3504,9 @@
               </a:defRPr>
             </a:pPr>
             <a:r>
-              <a:rPr dirty="0" smtClean="0"/>
+              <a:rPr dirty="0"/>
               <a:t>Conclusion</a:t>
             </a:r>
-            <a:endParaRPr dirty="0"/>
           </a:p>
         </p:txBody>
       </p:sp>
@@ -3612,16 +3566,12 @@
               </a:defRPr>
             </a:pPr>
             <a:r>
-              <a:rPr lang="en-GB" dirty="0" smtClean="0"/>
+              <a:rPr lang="en-GB" dirty="0"/>
               <a:t>1</a:t>
             </a:r>
             <a:r>
-              <a:rPr dirty="0" smtClean="0"/>
-              <a:t>. </a:t>
-            </a:r>
-            <a:r>
               <a:rPr dirty="0"/>
-              <a:t>Problem Statement</a:t>
+              <a:t>. Problem Statement</a:t>
             </a:r>
           </a:p>
         </p:txBody>
@@ -3737,16 +3687,12 @@
               </a:defRPr>
             </a:pPr>
             <a:r>
-              <a:rPr lang="en-GB" dirty="0" smtClean="0"/>
+              <a:rPr lang="en-GB" dirty="0"/>
               <a:t>2</a:t>
             </a:r>
             <a:r>
-              <a:rPr dirty="0" smtClean="0"/>
-              <a:t>. </a:t>
-            </a:r>
-            <a:r>
               <a:rPr dirty="0"/>
-              <a:t>Proposed Solution</a:t>
+              <a:t>. Proposed Solution</a:t>
             </a:r>
           </a:p>
         </p:txBody>
@@ -3782,12 +3728,8 @@
               <a:t>T</a:t>
             </a:r>
             <a:r>
-              <a:rPr dirty="0" smtClean="0"/>
-              <a:t>he </a:t>
-            </a:r>
-            <a:r>
               <a:rPr dirty="0"/>
-              <a:t>system will employ RFID cards and readers to verify student identity in real-time. This will ensure that only authorized students can board the bus, preventing misuse by unauthorized users.</a:t>
+              <a:t>he system will employ RFID cards and readers to verify student identity in real-time. This will ensure that only authorized students can board the bus, preventing misuse by unauthorized users.</a:t>
             </a:r>
           </a:p>
           <a:p>
@@ -3874,16 +3816,12 @@
               </a:defRPr>
             </a:pPr>
             <a:r>
-              <a:rPr lang="en-GB" dirty="0" smtClean="0"/>
+              <a:rPr lang="en-GB" dirty="0"/>
               <a:t>3</a:t>
             </a:r>
             <a:r>
-              <a:rPr dirty="0" smtClean="0"/>
-              <a:t>. </a:t>
-            </a:r>
-            <a:r>
               <a:rPr dirty="0"/>
-              <a:t>Key Features</a:t>
+              <a:t>. Key Features</a:t>
             </a:r>
           </a:p>
         </p:txBody>
@@ -3942,10 +3880,9 @@
               </a:defRPr>
             </a:pPr>
             <a:r>
-              <a:rPr sz="1800" b="1" dirty="0" smtClean="0"/>
+              <a:rPr sz="1800" b="1" dirty="0"/>
               <a:t>Real-Time ID Verification:</a:t>
             </a:r>
-            <a:endParaRPr sz="1800" b="1" dirty="0"/>
           </a:p>
           <a:p>
             <a:pPr marL="0" indent="0" algn="l">
@@ -3958,15 +3895,7 @@
             </a:pPr>
             <a:r>
               <a:rPr sz="1600" dirty="0"/>
-              <a:t>The system will use </a:t>
-            </a:r>
-            <a:r>
-              <a:rPr sz="1600" dirty="0" smtClean="0"/>
-              <a:t>RFID </a:t>
-            </a:r>
-            <a:r>
-              <a:rPr sz="1600" dirty="0"/>
-              <a:t>technology to ensure that only authorized students can board the bus. RFID cards will be scanned in real-time, preventing unauthorized access and ensuring that fare-paying students can use the service.</a:t>
+              <a:t>The system will use RFID technology to ensure that only authorized students can board the bus. RFID cards will be scanned in real-time, preventing unauthorized access and ensuring that fare-paying students can use the service.</a:t>
             </a:r>
           </a:p>
           <a:p>
@@ -3978,7 +3907,7 @@
                 </a:solidFill>
               </a:defRPr>
             </a:pPr>
-            <a:endParaRPr lang="en-US" sz="1600" dirty="0" smtClean="0"/>
+            <a:endParaRPr lang="en-US" sz="1600" dirty="0"/>
           </a:p>
           <a:p>
             <a:pPr marL="0" indent="0" algn="l">
@@ -4000,7 +3929,7 @@
                 </a:solidFill>
               </a:defRPr>
             </a:pPr>
-            <a:endParaRPr lang="en-US" sz="1600" dirty="0" smtClean="0"/>
+            <a:endParaRPr lang="en-US" sz="1600" dirty="0"/>
           </a:p>
           <a:p>
             <a:pPr marL="0" indent="0" algn="l">
@@ -4022,7 +3951,7 @@
                 </a:solidFill>
               </a:defRPr>
             </a:pPr>
-            <a:endParaRPr lang="en-US" sz="1600" dirty="0" smtClean="0"/>
+            <a:endParaRPr lang="en-US" sz="1600" dirty="0"/>
           </a:p>
           <a:p>
             <a:pPr marL="0" indent="0" algn="l">
@@ -4044,7 +3973,7 @@
                 </a:solidFill>
               </a:defRPr>
             </a:pPr>
-            <a:endParaRPr lang="en-US" sz="1600" dirty="0" smtClean="0"/>
+            <a:endParaRPr lang="en-US" sz="1600" dirty="0"/>
           </a:p>
           <a:p>
             <a:pPr marL="0" indent="0" algn="l">
@@ -4066,7 +3995,7 @@
                 </a:solidFill>
               </a:defRPr>
             </a:pPr>
-            <a:endParaRPr lang="en-US" sz="1600" dirty="0" smtClean="0"/>
+            <a:endParaRPr lang="en-US" sz="1600" dirty="0"/>
           </a:p>
           <a:p>
             <a:pPr marL="0" indent="0" algn="l">
@@ -4376,16 +4305,12 @@
               </a:defRPr>
             </a:pPr>
             <a:r>
-              <a:rPr lang="en-GB" dirty="0" smtClean="0"/>
+              <a:rPr lang="en-GB" dirty="0"/>
               <a:t>4</a:t>
             </a:r>
             <a:r>
-              <a:rPr dirty="0" smtClean="0"/>
-              <a:t>. </a:t>
-            </a:r>
-            <a:r>
               <a:rPr dirty="0"/>
-              <a:t>Technology Stack</a:t>
+              <a:t>. Technology Stack</a:t>
             </a:r>
           </a:p>
         </p:txBody>
@@ -4450,7 +4375,14 @@
             </a:pPr>
             <a:r>
               <a:rPr dirty="0"/>
-              <a:t>2. React.js and Next.js: To build a dynamic and responsive admin panel for managing routes, bus occupancy, and driver performance.</a:t>
+              <a:t>2</a:t>
+            </a:r>
+            <a:r>
+              <a:t>. Next</a:t>
+            </a:r>
+            <a:r>
+              <a:rPr dirty="0"/>
+              <a:t>.js: To build a dynamic and responsive admin panel for managing routes, bus occupancy, and driver performance.</a:t>
             </a:r>
           </a:p>
           <a:p>
@@ -4497,45 +4429,33 @@
             </a:r>
             <a:r>
               <a:rPr dirty="0"/>
-              <a:t> for accurate live </a:t>
-            </a:r>
-            <a:r>
-              <a:rPr dirty="0" smtClean="0"/>
-              <a:t>mapping</a:t>
-            </a:r>
-            <a:r>
-              <a:rPr lang="en-US" dirty="0" smtClean="0"/>
+              <a:t> for accurate live mapping</a:t>
+            </a:r>
+            <a:r>
+              <a:rPr lang="en-US" dirty="0"/>
               <a:t>, </a:t>
             </a:r>
             <a:r>
-              <a:rPr dirty="0" smtClean="0"/>
-              <a:t>route </a:t>
-            </a:r>
-            <a:r>
               <a:rPr dirty="0"/>
-              <a:t>tracking of </a:t>
-            </a:r>
-            <a:r>
-              <a:rPr dirty="0" smtClean="0"/>
-              <a:t>buses</a:t>
-            </a:r>
-            <a:r>
-              <a:rPr lang="en-US" dirty="0" smtClean="0"/>
+              <a:t>route tracking of buses</a:t>
+            </a:r>
+            <a:r>
+              <a:rPr lang="en-US" dirty="0"/>
               <a:t> and turf </a:t>
             </a:r>
             <a:r>
-              <a:rPr lang="en-US" dirty="0" err="1" smtClean="0"/>
+              <a:rPr lang="en-US" dirty="0" err="1"/>
               <a:t>js</a:t>
             </a:r>
             <a:r>
-              <a:rPr lang="en-US" dirty="0" smtClean="0"/>
+              <a:rPr lang="en-US" dirty="0"/>
               <a:t> to alert the management if bus goes off route</a:t>
             </a:r>
             <a:r>
-              <a:rPr dirty="0" smtClean="0"/>
+              <a:rPr dirty="0"/>
               <a:t>.</a:t>
             </a:r>
-            <a:endParaRPr lang="en-US" dirty="0" smtClean="0"/>
+            <a:endParaRPr lang="en-US" dirty="0"/>
           </a:p>
         </p:txBody>
       </p:sp>
@@ -4693,16 +4613,12 @@
               </a:defRPr>
             </a:pPr>
             <a:r>
-              <a:rPr lang="en-GB" dirty="0" smtClean="0"/>
+              <a:rPr lang="en-GB" dirty="0"/>
               <a:t>5</a:t>
             </a:r>
             <a:r>
-              <a:rPr dirty="0" smtClean="0"/>
-              <a:t>. </a:t>
-            </a:r>
-            <a:r>
               <a:rPr dirty="0"/>
-              <a:t>Expected Outcomes</a:t>
+              <a:t>. Expected Outcomes</a:t>
             </a:r>
           </a:p>
         </p:txBody>
@@ -4754,12 +4670,8 @@
               </a:defRPr>
             </a:pPr>
             <a:r>
-              <a:rPr dirty="0" smtClean="0"/>
-              <a:t>Enhanced </a:t>
-            </a:r>
-            <a:r>
               <a:rPr dirty="0"/>
-              <a:t>security through real-time RFID student ID verification, preventing unauthorized access to buses.</a:t>
+              <a:t>Enhanced security through real-time RFID student ID verification, preventing unauthorized access to buses.</a:t>
             </a:r>
           </a:p>
           <a:p>
@@ -4771,12 +4683,8 @@
               </a:defRPr>
             </a:pPr>
             <a:r>
-              <a:rPr dirty="0" smtClean="0"/>
-              <a:t>Optimized </a:t>
-            </a:r>
-            <a:r>
               <a:rPr dirty="0"/>
-              <a:t>bus capacity management by reducing overcrowding and preventing underutilization.</a:t>
+              <a:t>Optimized bus capacity management by reducing overcrowding and preventing underutilization.</a:t>
             </a:r>
           </a:p>
           <a:p>
@@ -4788,12 +4696,8 @@
               </a:defRPr>
             </a:pPr>
             <a:r>
-              <a:rPr dirty="0" smtClean="0"/>
-              <a:t>Improved </a:t>
-            </a:r>
-            <a:r>
               <a:rPr dirty="0"/>
-              <a:t>communication with students and parents, ensuring they are informed about transport delays or route changes in real-time.</a:t>
+              <a:t>Improved communication with students and parents, ensuring they are informed about transport delays or route changes in real-time.</a:t>
             </a:r>
           </a:p>
           <a:p>
@@ -4809,16 +4713,12 @@
               <a:t>I</a:t>
             </a:r>
             <a:r>
-              <a:rPr dirty="0" err="1" smtClean="0"/>
+              <a:rPr dirty="0" err="1"/>
               <a:t>ncreased</a:t>
             </a:r>
             <a:r>
-              <a:rPr dirty="0" smtClean="0"/>
-              <a:t> </a:t>
-            </a:r>
-            <a:r>
               <a:rPr dirty="0"/>
-              <a:t>efficiency in transportation operations through live GPS tracking and driver performance monitoring.</a:t>
+              <a:t> efficiency in transportation operations through live GPS tracking and driver performance monitoring.</a:t>
             </a:r>
           </a:p>
           <a:p>
@@ -4830,12 +4730,8 @@
               </a:defRPr>
             </a:pPr>
             <a:r>
-              <a:rPr dirty="0" smtClean="0"/>
-              <a:t>Greater </a:t>
-            </a:r>
-            <a:r>
               <a:rPr dirty="0"/>
-              <a:t>transparency and control for university administrators, allowing for better route and schedule planning.</a:t>
+              <a:t>Greater transparency and control for university administrators, allowing for better route and schedule planning.</a:t>
             </a:r>
           </a:p>
         </p:txBody>

</xml_diff>